<commit_message>
created a test class for the BO
</commit_message>
<xml_diff>
--- a/Desenvolvimento Back-end e Design Patterns/Semestre2/20 - JDBC.pptx
+++ b/Desenvolvimento Back-end e Design Patterns/Semestre2/20 - JDBC.pptx
@@ -156,7 +156,7 @@
   </p:defaultTextStyle>
   <p:extLst>
     <p:ext uri="{EFAFB233-063F-42B5-8137-9DF3F51BA10A}">
-      <p15:sldGuideLst xmlns:p15="http://schemas.microsoft.com/office/powerpoint/2012/main">
+      <p15:sldGuideLst xmlns="" xmlns:p15="http://schemas.microsoft.com/office/powerpoint/2012/main">
         <p15:guide id="1" orient="horz" pos="2160">
           <p15:clr>
             <a:srgbClr val="A4A3A4"/>
@@ -4670,7 +4670,7 @@
           <a:p>
             <a:fld id="{1DC6CD5E-26BD-9B45-BB2F-78648736C277}" type="slidenum">
               <a:rPr lang="en-US" smtClean="0"/>
-              <a:t>‹#›</a:t>
+              <a:t>‹nº›</a:t>
             </a:fld>
             <a:endParaRPr lang="en-US"/>
           </a:p>
@@ -5449,7 +5449,7 @@
             <a:fld id="{9E6C589D-6B0F-420F-8E10-BF96F97B9040}" type="slidenum">
               <a:rPr lang="pt-BR" smtClean="0"/>
               <a:pPr/>
-              <a:t>‹#›</a:t>
+              <a:t>‹nº›</a:t>
             </a:fld>
             <a:endParaRPr lang="pt-BR"/>
           </a:p>
@@ -5569,7 +5569,7 @@
             <a:fld id="{9E6C589D-6B0F-420F-8E10-BF96F97B9040}" type="slidenum">
               <a:rPr lang="pt-BR" smtClean="0"/>
               <a:pPr/>
-              <a:t>‹#›</a:t>
+              <a:t>‹nº›</a:t>
             </a:fld>
             <a:endParaRPr lang="pt-BR"/>
           </a:p>
@@ -5666,7 +5666,7 @@
             <a:fld id="{9E6C589D-6B0F-420F-8E10-BF96F97B9040}" type="slidenum">
               <a:rPr lang="pt-BR" smtClean="0"/>
               <a:pPr/>
-              <a:t>‹#›</a:t>
+              <a:t>‹nº›</a:t>
             </a:fld>
             <a:endParaRPr lang="pt-BR"/>
           </a:p>
@@ -5945,7 +5945,7 @@
             <a:fld id="{9E6C589D-6B0F-420F-8E10-BF96F97B9040}" type="slidenum">
               <a:rPr lang="pt-BR" smtClean="0"/>
               <a:pPr/>
-              <a:t>‹#›</a:t>
+              <a:t>‹nº›</a:t>
             </a:fld>
             <a:endParaRPr lang="pt-BR"/>
           </a:p>
@@ -6204,7 +6204,7 @@
             <a:fld id="{9E6C589D-6B0F-420F-8E10-BF96F97B9040}" type="slidenum">
               <a:rPr lang="pt-BR" smtClean="0"/>
               <a:pPr/>
-              <a:t>‹#›</a:t>
+              <a:t>‹nº›</a:t>
             </a:fld>
             <a:endParaRPr lang="pt-BR"/>
           </a:p>
@@ -6376,7 +6376,7 @@
             <a:fld id="{9E6C589D-6B0F-420F-8E10-BF96F97B9040}" type="slidenum">
               <a:rPr lang="pt-BR" smtClean="0"/>
               <a:pPr/>
-              <a:t>‹#›</a:t>
+              <a:t>‹nº›</a:t>
             </a:fld>
             <a:endParaRPr lang="pt-BR"/>
           </a:p>
@@ -6558,7 +6558,7 @@
             <a:fld id="{9E6C589D-6B0F-420F-8E10-BF96F97B9040}" type="slidenum">
               <a:rPr lang="pt-BR" smtClean="0"/>
               <a:pPr/>
-              <a:t>‹#›</a:t>
+              <a:t>‹nº›</a:t>
             </a:fld>
             <a:endParaRPr lang="pt-BR"/>
           </a:p>
@@ -6935,7 +6935,7 @@
           <a:p>
             <a:fld id="{076629CB-7937-4506-A327-ACF88B95BB03}" type="slidenum">
               <a:rPr lang="en-US" smtClean="0"/>
-              <a:t>‹#›</a:t>
+              <a:t>‹nº›</a:t>
             </a:fld>
             <a:endParaRPr lang="en-US"/>
           </a:p>
@@ -7107,7 +7107,7 @@
             <a:fld id="{0DBB9FE3-D63C-4A40-B010-4651D12E128D}" type="slidenum">
               <a:rPr lang="pt-BR" smtClean="0"/>
               <a:pPr/>
-              <a:t>‹#›</a:t>
+              <a:t>‹nº›</a:t>
             </a:fld>
             <a:endParaRPr lang="pt-BR"/>
           </a:p>
@@ -7383,7 +7383,7 @@
           <a:p>
             <a:fld id="{076629CB-7937-4506-A327-ACF88B95BB03}" type="slidenum">
               <a:rPr lang="en-US" smtClean="0"/>
-              <a:t>‹#›</a:t>
+              <a:t>‹nº›</a:t>
             </a:fld>
             <a:endParaRPr lang="en-US"/>
           </a:p>
@@ -7673,7 +7673,7 @@
             <a:fld id="{0DBB9FE3-D63C-4A40-B010-4651D12E128D}" type="slidenum">
               <a:rPr lang="pt-BR" smtClean="0"/>
               <a:pPr/>
-              <a:t>‹#›</a:t>
+              <a:t>‹nº›</a:t>
             </a:fld>
             <a:endParaRPr lang="pt-BR"/>
           </a:p>
@@ -8097,7 +8097,7 @@
             <a:fld id="{0DBB9FE3-D63C-4A40-B010-4651D12E128D}" type="slidenum">
               <a:rPr lang="pt-BR" smtClean="0"/>
               <a:pPr/>
-              <a:t>‹#›</a:t>
+              <a:t>‹nº›</a:t>
             </a:fld>
             <a:endParaRPr lang="pt-BR"/>
           </a:p>
@@ -8217,7 +8217,7 @@
             <a:fld id="{0DBB9FE3-D63C-4A40-B010-4651D12E128D}" type="slidenum">
               <a:rPr lang="pt-BR" smtClean="0"/>
               <a:pPr/>
-              <a:t>‹#›</a:t>
+              <a:t>‹nº›</a:t>
             </a:fld>
             <a:endParaRPr lang="pt-BR"/>
           </a:p>
@@ -8312,7 +8312,7 @@
           <a:p>
             <a:fld id="{93E4AAA4-6363-4581-962D-1ACCC2D600C5}" type="slidenum">
               <a:rPr lang="en-US" smtClean="0"/>
-              <a:t>‹#›</a:t>
+              <a:t>‹nº›</a:t>
             </a:fld>
             <a:endParaRPr lang="en-US"/>
           </a:p>
@@ -8591,7 +8591,7 @@
             <a:fld id="{0DBB9FE3-D63C-4A40-B010-4651D12E128D}" type="slidenum">
               <a:rPr lang="pt-BR" smtClean="0"/>
               <a:pPr/>
-              <a:t>‹#›</a:t>
+              <a:t>‹nº›</a:t>
             </a:fld>
             <a:endParaRPr lang="pt-BR"/>
           </a:p>
@@ -8846,7 +8846,7 @@
             <a:fld id="{0DBB9FE3-D63C-4A40-B010-4651D12E128D}" type="slidenum">
               <a:rPr lang="pt-BR" smtClean="0"/>
               <a:pPr/>
-              <a:t>‹#›</a:t>
+              <a:t>‹nº›</a:t>
             </a:fld>
             <a:endParaRPr lang="pt-BR"/>
           </a:p>
@@ -9018,7 +9018,7 @@
             <a:fld id="{0DBB9FE3-D63C-4A40-B010-4651D12E128D}" type="slidenum">
               <a:rPr lang="pt-BR" smtClean="0"/>
               <a:pPr/>
-              <a:t>‹#›</a:t>
+              <a:t>‹nº›</a:t>
             </a:fld>
             <a:endParaRPr lang="pt-BR"/>
           </a:p>
@@ -9200,7 +9200,7 @@
             <a:fld id="{0DBB9FE3-D63C-4A40-B010-4651D12E128D}" type="slidenum">
               <a:rPr lang="pt-BR" smtClean="0"/>
               <a:pPr/>
-              <a:t>‹#›</a:t>
+              <a:t>‹nº›</a:t>
             </a:fld>
             <a:endParaRPr lang="pt-BR"/>
           </a:p>
@@ -9866,7 +9866,7 @@
             <a:fld id="{9E6C589D-6B0F-420F-8E10-BF96F97B9040}" type="slidenum">
               <a:rPr lang="pt-BR" smtClean="0"/>
               <a:pPr/>
-              <a:t>‹#›</a:t>
+              <a:t>‹nº›</a:t>
             </a:fld>
             <a:endParaRPr lang="pt-BR"/>
           </a:p>
@@ -10038,7 +10038,7 @@
             <a:fld id="{9E6C589D-6B0F-420F-8E10-BF96F97B9040}" type="slidenum">
               <a:rPr lang="pt-BR" smtClean="0"/>
               <a:pPr/>
-              <a:t>‹#›</a:t>
+              <a:t>‹nº›</a:t>
             </a:fld>
             <a:endParaRPr lang="pt-BR"/>
           </a:p>
@@ -10286,7 +10286,7 @@
             <a:fld id="{9E6C589D-6B0F-420F-8E10-BF96F97B9040}" type="slidenum">
               <a:rPr lang="pt-BR" smtClean="0"/>
               <a:pPr/>
-              <a:t>‹#›</a:t>
+              <a:t>‹nº›</a:t>
             </a:fld>
             <a:endParaRPr lang="pt-BR"/>
           </a:p>
@@ -10576,7 +10576,7 @@
             <a:fld id="{9E6C589D-6B0F-420F-8E10-BF96F97B9040}" type="slidenum">
               <a:rPr lang="pt-BR" smtClean="0"/>
               <a:pPr/>
-              <a:t>‹#›</a:t>
+              <a:t>‹nº›</a:t>
             </a:fld>
             <a:endParaRPr lang="pt-BR"/>
           </a:p>
@@ -10827,7 +10827,7 @@
             <a:fld id="{0DBB9FE3-D63C-4A40-B010-4651D12E128D}" type="slidenum">
               <a:rPr lang="pt-BR" smtClean="0"/>
               <a:pPr/>
-              <a:t>‹#›</a:t>
+              <a:t>‹nº›</a:t>
             </a:fld>
             <a:endParaRPr lang="pt-BR"/>
           </a:p>
@@ -11352,7 +11352,7 @@
             <a:fld id="{B979B6C0-1EBF-4909-A23C-2B4E6C0F9776}" type="slidenum">
               <a:rPr lang="pt-BR" smtClean="0"/>
               <a:pPr/>
-              <a:t>‹#›</a:t>
+              <a:t>‹nº›</a:t>
             </a:fld>
             <a:endParaRPr lang="pt-BR"/>
           </a:p>
@@ -11875,7 +11875,7 @@
             <a:fld id="{DA8BDE16-AB64-4071-8A5E-208E5097AA46}" type="slidenum">
               <a:rPr lang="pt-BR" smtClean="0"/>
               <a:pPr/>
-              <a:t>‹#›</a:t>
+              <a:t>‹nº›</a:t>
             </a:fld>
             <a:endParaRPr lang="pt-BR"/>
           </a:p>
@@ -12398,7 +12398,7 @@
             <a:fld id="{9E6C589D-6B0F-420F-8E10-BF96F97B9040}" type="slidenum">
               <a:rPr lang="pt-BR" smtClean="0"/>
               <a:pPr/>
-              <a:t>‹#›</a:t>
+              <a:t>‹nº›</a:t>
             </a:fld>
             <a:endParaRPr lang="pt-BR"/>
           </a:p>
@@ -12911,7 +12911,7 @@
             <a:fld id="{0DBB9FE3-D63C-4A40-B010-4651D12E128D}" type="slidenum">
               <a:rPr lang="pt-BR" smtClean="0"/>
               <a:pPr/>
-              <a:t>‹#›</a:t>
+              <a:t>‹nº›</a:t>
             </a:fld>
             <a:endParaRPr lang="pt-BR"/>
           </a:p>
@@ -13968,7 +13968,7 @@
           <a:graphicData uri="http://schemas.openxmlformats.org/presentationml/2006/ole">
             <mc:AlternateContent xmlns:mc="http://schemas.openxmlformats.org/markup-compatibility/2006">
               <mc:Choice xmlns:v="urn:schemas-microsoft-com:vml" Requires="v">
-                <p:oleObj spid="_x0000_s3113" name="Planilha" r:id="rId4" imgW="5343920" imgH="819421" progId="Excel.Sheet.8">
+                <p:oleObj spid="_x0000_s3111" name="Planilha" r:id="rId4" imgW="5343920" imgH="819421" progId="Excel.Sheet.8">
                   <p:embed/>
                 </p:oleObj>
               </mc:Choice>
@@ -18701,7 +18701,27 @@
                 <a:latin typeface="Gotham-Bold"/>
                 <a:cs typeface="Gotham-Bold"/>
               </a:rPr>
-              <a:t>20. JDBC</a:t>
+              <a:t>20</a:t>
+            </a:r>
+            <a:r>
+              <a:rPr lang="en-US" sz="5400" dirty="0" smtClean="0">
+                <a:solidFill>
+                  <a:srgbClr val="FFFFFF"/>
+                </a:solidFill>
+                <a:latin typeface="Gotham-Bold"/>
+                <a:cs typeface="Gotham-Bold"/>
+              </a:rPr>
+              <a:t>. </a:t>
+            </a:r>
+            <a:r>
+              <a:rPr lang="en-US" sz="5400" dirty="0" smtClean="0">
+                <a:solidFill>
+                  <a:srgbClr val="FFFFFF"/>
+                </a:solidFill>
+                <a:latin typeface="Gotham-Bold"/>
+                <a:cs typeface="Gotham-Bold"/>
+              </a:rPr>
+              <a:t>JDBC</a:t>
             </a:r>
             <a:endParaRPr lang="en-US" sz="5400" dirty="0">
               <a:solidFill>
@@ -21622,7 +21642,7 @@
           <a:graphicData uri="http://schemas.openxmlformats.org/presentationml/2006/ole">
             <mc:AlternateContent xmlns:mc="http://schemas.openxmlformats.org/markup-compatibility/2006">
               <mc:Choice xmlns:v="urn:schemas-microsoft-com:vml" Requires="v">
-                <p:oleObj spid="_x0000_s4134" name="CorelPhotoPaint.Image.10" r:id="rId4" imgW="1209524" imgH="1257143" progId="CorelPhotoPaint.Image.10">
+                <p:oleObj spid="_x0000_s4132" name="CorelPhotoPaint.Image.10" r:id="rId4" imgW="1209524" imgH="1257143" progId="CorelPhotoPaint.Image.10">
                   <p:embed/>
                 </p:oleObj>
               </mc:Choice>
@@ -23827,19 +23847,35 @@
         </p:blipFill>
         <p:spPr bwMode="auto">
           <a:xfrm>
-            <a:off x="418147" y="200467"/>
+            <a:off x="266075" y="2392789"/>
             <a:ext cx="8725853" cy="4158414"/>
           </a:xfrm>
           <a:prstGeom prst="rect">
             <a:avLst/>
           </a:prstGeom>
-          <a:solidFill>
-            <a:schemeClr val="bg1"/>
-          </a:solidFill>
+          <a:noFill/>
           <a:ln>
             <a:noFill/>
           </a:ln>
-          <a:extLst/>
+          <a:extLst>
+            <a:ext uri="{909E8E84-426E-40DD-AFC4-6F175D3DCCD1}">
+              <a14:hiddenFill xmlns:a14="http://schemas.microsoft.com/office/drawing/2010/main">
+                <a:solidFill>
+                  <a:schemeClr val="accent1"/>
+                </a:solidFill>
+              </a14:hiddenFill>
+            </a:ext>
+            <a:ext uri="{91240B29-F687-4F45-9708-019B960494DF}">
+              <a14:hiddenLine xmlns:a14="http://schemas.microsoft.com/office/drawing/2010/main" w="9525">
+                <a:solidFill>
+                  <a:schemeClr val="tx1"/>
+                </a:solidFill>
+                <a:miter lim="800000"/>
+                <a:headEnd/>
+                <a:tailEnd/>
+              </a14:hiddenLine>
+            </a:ext>
+          </a:extLst>
         </p:spPr>
       </p:pic>
       <p:sp>
@@ -24001,6 +24037,130 @@
           </a:prstGeom>
         </p:spPr>
       </p:pic>
+      <p:sp>
+        <p:nvSpPr>
+          <p:cNvPr id="18" name="TextBox 8"/>
+          <p:cNvSpPr txBox="1"/>
+          <p:nvPr/>
+        </p:nvSpPr>
+        <p:spPr>
+          <a:xfrm>
+            <a:off x="947124" y="687383"/>
+            <a:ext cx="7363756" cy="480131"/>
+          </a:xfrm>
+          <a:prstGeom prst="rect">
+            <a:avLst/>
+          </a:prstGeom>
+          <a:noFill/>
+        </p:spPr>
+        <p:txBody>
+          <a:bodyPr wrap="square" rtlCol="0">
+            <a:spAutoFit/>
+          </a:bodyPr>
+          <a:lstStyle/>
+          <a:p>
+            <a:pPr>
+              <a:lnSpc>
+                <a:spcPct val="90000"/>
+              </a:lnSpc>
+            </a:pPr>
+            <a:r>
+              <a:rPr lang="en-US" sz="2800" b="1" dirty="0" smtClean="0">
+                <a:solidFill>
+                  <a:srgbClr val="303030"/>
+                </a:solidFill>
+                <a:latin typeface="Gotham-Bold"/>
+                <a:cs typeface="Gotham-Book"/>
+              </a:rPr>
+              <a:t>JDBC - CONEXÃO</a:t>
+            </a:r>
+          </a:p>
+        </p:txBody>
+      </p:sp>
+      <p:sp>
+        <p:nvSpPr>
+          <p:cNvPr id="2" name="Retângulo 1"/>
+          <p:cNvSpPr/>
+          <p:nvPr/>
+        </p:nvSpPr>
+        <p:spPr>
+          <a:xfrm>
+            <a:off x="721135" y="1372565"/>
+            <a:ext cx="7545501" cy="978729"/>
+          </a:xfrm>
+          <a:prstGeom prst="rect">
+            <a:avLst/>
+          </a:prstGeom>
+        </p:spPr>
+        <p:txBody>
+          <a:bodyPr wrap="square">
+            <a:spAutoFit/>
+          </a:bodyPr>
+          <a:lstStyle/>
+          <a:p>
+            <a:pPr>
+              <a:lnSpc>
+                <a:spcPct val="90000"/>
+              </a:lnSpc>
+              <a:spcBef>
+                <a:spcPct val="30000"/>
+              </a:spcBef>
+              <a:buClr>
+                <a:schemeClr val="bg2"/>
+              </a:buClr>
+            </a:pPr>
+            <a:r>
+              <a:rPr lang="en-US" altLang="pt-BR" sz="3200" b="1" dirty="0" err="1" smtClean="0"/>
+              <a:t>Exemplo</a:t>
+            </a:r>
+            <a:r>
+              <a:rPr lang="en-US" altLang="pt-BR" sz="3200" b="1" dirty="0" smtClean="0"/>
+              <a:t> 2: </a:t>
+            </a:r>
+            <a:r>
+              <a:rPr lang="en-US" altLang="pt-BR" sz="3200" dirty="0" err="1" smtClean="0"/>
+              <a:t>crie</a:t>
+            </a:r>
+            <a:r>
+              <a:rPr lang="en-US" altLang="pt-BR" sz="3200" dirty="0" smtClean="0"/>
+              <a:t> a </a:t>
+            </a:r>
+            <a:r>
+              <a:rPr lang="en-US" altLang="pt-BR" sz="3200" dirty="0" err="1" smtClean="0"/>
+              <a:t>classe</a:t>
+            </a:r>
+            <a:r>
+              <a:rPr lang="en-US" altLang="pt-BR" sz="3200" dirty="0" smtClean="0"/>
+              <a:t> </a:t>
+            </a:r>
+            <a:r>
+              <a:rPr lang="en-US" altLang="pt-BR" sz="3200" b="1" dirty="0" smtClean="0"/>
+              <a:t>Conexao_v2</a:t>
+            </a:r>
+            <a:r>
+              <a:rPr lang="en-US" altLang="pt-BR" sz="3200" dirty="0" smtClean="0"/>
+              <a:t> e monte o </a:t>
+            </a:r>
+            <a:r>
+              <a:rPr lang="en-US" altLang="pt-BR" sz="3200" dirty="0" err="1" smtClean="0"/>
+              <a:t>código</a:t>
+            </a:r>
+            <a:r>
+              <a:rPr lang="en-US" altLang="pt-BR" sz="3200" dirty="0" smtClean="0"/>
+              <a:t> </a:t>
+            </a:r>
+            <a:r>
+              <a:rPr lang="en-US" altLang="pt-BR" sz="3200" dirty="0" err="1" smtClean="0"/>
+              <a:t>abaixo</a:t>
+            </a:r>
+            <a:r>
+              <a:rPr lang="en-US" altLang="pt-BR" sz="3200" dirty="0" smtClean="0"/>
+              <a:t>:</a:t>
+            </a:r>
+            <a:endParaRPr lang="en-US" altLang="pt-BR" sz="3200" b="1" dirty="0"/>
+          </a:p>
+        </p:txBody>
+      </p:sp>
     </p:spTree>
     <p:extLst>
       <p:ext uri="{BB962C8B-B14F-4D97-AF65-F5344CB8AC3E}">
@@ -35524,7 +35684,7 @@
           <a:graphicData uri="http://schemas.openxmlformats.org/presentationml/2006/ole">
             <mc:AlternateContent xmlns:mc="http://schemas.openxmlformats.org/markup-compatibility/2006">
               <mc:Choice xmlns:v="urn:schemas-microsoft-com:vml" Requires="v">
-                <p:oleObj spid="_x0000_s1064" name="CorelPhotoPaint.Image.10" r:id="rId4" imgW="1803175" imgH="1473016" progId="CorelPhotoPaint.Image.10">
+                <p:oleObj spid="_x0000_s1062" name="CorelPhotoPaint.Image.10" r:id="rId4" imgW="1803175" imgH="1473016" progId="CorelPhotoPaint.Image.10">
                   <p:embed/>
                 </p:oleObj>
               </mc:Choice>

</xml_diff>